<commit_message>
half way through sampling
</commit_message>
<xml_diff>
--- a/images/inference/power-diagram.pptx
+++ b/images/inference/power-diagram.pptx
@@ -105,6 +105,11 @@
       </a:defRPr>
     </a:lvl9pPr>
   </p:defaultTextStyle>
+  <p:extLst>
+    <p:ext uri="{EFAFB233-063F-42B5-8137-9DF3F51BA10A}">
+      <p15:sldGuideLst xmlns:p15="http://schemas.microsoft.com/office/powerpoint/2012/main"/>
+    </p:ext>
+  </p:extLst>
 </p:presentation>
 </file>
 
@@ -553,7 +558,7 @@
           <a:p>
             <a:fld id="{5303E370-D265-2C46-8068-DCA558B4929C}" type="datetimeFigureOut">
               <a:rPr lang="en-US" smtClean="0"/>
-              <a:t>6/20/22</a:t>
+              <a:t>8/10/22</a:t>
             </a:fld>
             <a:endParaRPr lang="en-US"/>
           </a:p>
@@ -751,7 +756,7 @@
           <a:p>
             <a:fld id="{5303E370-D265-2C46-8068-DCA558B4929C}" type="datetimeFigureOut">
               <a:rPr lang="en-US" smtClean="0"/>
-              <a:t>6/20/22</a:t>
+              <a:t>8/10/22</a:t>
             </a:fld>
             <a:endParaRPr lang="en-US"/>
           </a:p>
@@ -959,7 +964,7 @@
           <a:p>
             <a:fld id="{5303E370-D265-2C46-8068-DCA558B4929C}" type="datetimeFigureOut">
               <a:rPr lang="en-US" smtClean="0"/>
-              <a:t>6/20/22</a:t>
+              <a:t>8/10/22</a:t>
             </a:fld>
             <a:endParaRPr lang="en-US"/>
           </a:p>
@@ -1157,7 +1162,7 @@
           <a:p>
             <a:fld id="{5303E370-D265-2C46-8068-DCA558B4929C}" type="datetimeFigureOut">
               <a:rPr lang="en-US" smtClean="0"/>
-              <a:t>6/20/22</a:t>
+              <a:t>8/10/22</a:t>
             </a:fld>
             <a:endParaRPr lang="en-US"/>
           </a:p>
@@ -1432,7 +1437,7 @@
           <a:p>
             <a:fld id="{5303E370-D265-2C46-8068-DCA558B4929C}" type="datetimeFigureOut">
               <a:rPr lang="en-US" smtClean="0"/>
-              <a:t>6/20/22</a:t>
+              <a:t>8/10/22</a:t>
             </a:fld>
             <a:endParaRPr lang="en-US"/>
           </a:p>
@@ -1697,7 +1702,7 @@
           <a:p>
             <a:fld id="{5303E370-D265-2C46-8068-DCA558B4929C}" type="datetimeFigureOut">
               <a:rPr lang="en-US" smtClean="0"/>
-              <a:t>6/20/22</a:t>
+              <a:t>8/10/22</a:t>
             </a:fld>
             <a:endParaRPr lang="en-US"/>
           </a:p>
@@ -2109,7 +2114,7 @@
           <a:p>
             <a:fld id="{5303E370-D265-2C46-8068-DCA558B4929C}" type="datetimeFigureOut">
               <a:rPr lang="en-US" smtClean="0"/>
-              <a:t>6/20/22</a:t>
+              <a:t>8/10/22</a:t>
             </a:fld>
             <a:endParaRPr lang="en-US"/>
           </a:p>
@@ -2250,7 +2255,7 @@
           <a:p>
             <a:fld id="{5303E370-D265-2C46-8068-DCA558B4929C}" type="datetimeFigureOut">
               <a:rPr lang="en-US" smtClean="0"/>
-              <a:t>6/20/22</a:t>
+              <a:t>8/10/22</a:t>
             </a:fld>
             <a:endParaRPr lang="en-US"/>
           </a:p>
@@ -2363,7 +2368,7 @@
           <a:p>
             <a:fld id="{5303E370-D265-2C46-8068-DCA558B4929C}" type="datetimeFigureOut">
               <a:rPr lang="en-US" smtClean="0"/>
-              <a:t>6/20/22</a:t>
+              <a:t>8/10/22</a:t>
             </a:fld>
             <a:endParaRPr lang="en-US"/>
           </a:p>
@@ -2674,7 +2679,7 @@
           <a:p>
             <a:fld id="{5303E370-D265-2C46-8068-DCA558B4929C}" type="datetimeFigureOut">
               <a:rPr lang="en-US" smtClean="0"/>
-              <a:t>6/20/22</a:t>
+              <a:t>8/10/22</a:t>
             </a:fld>
             <a:endParaRPr lang="en-US"/>
           </a:p>
@@ -2962,7 +2967,7 @@
           <a:p>
             <a:fld id="{5303E370-D265-2C46-8068-DCA558B4929C}" type="datetimeFigureOut">
               <a:rPr lang="en-US" smtClean="0"/>
-              <a:t>6/20/22</a:t>
+              <a:t>8/10/22</a:t>
             </a:fld>
             <a:endParaRPr lang="en-US"/>
           </a:p>
@@ -3203,7 +3208,7 @@
           <a:p>
             <a:fld id="{5303E370-D265-2C46-8068-DCA558B4929C}" type="datetimeFigureOut">
               <a:rPr lang="en-US" smtClean="0"/>
-              <a:t>6/20/22</a:t>
+              <a:t>8/10/22</a:t>
             </a:fld>
             <a:endParaRPr lang="en-US"/>
           </a:p>
@@ -3620,8 +3625,8 @@
           <a:chExt cx="0" cy="0"/>
         </a:xfrm>
       </p:grpSpPr>
-      <mc:AlternateContent xmlns:mc="http://schemas.openxmlformats.org/markup-compatibility/2006">
-        <mc:Choice xmlns:p14="http://schemas.microsoft.com/office/powerpoint/2010/main" Requires="p14">
+      <mc:AlternateContent xmlns:mc="http://schemas.openxmlformats.org/markup-compatibility/2006" xmlns:p14="http://schemas.microsoft.com/office/powerpoint/2010/main">
+        <mc:Choice Requires="p14">
           <p:contentPart p14:bwMode="auto" r:id="rId2">
             <p14:nvContentPartPr>
               <p14:cNvPr id="4" name="Ink 3">
@@ -3640,7 +3645,7 @@
             </p14:xfrm>
           </p:contentPart>
         </mc:Choice>
-        <mc:Fallback>
+        <mc:Fallback xmlns="">
           <p:pic>
             <p:nvPicPr>
               <p:cNvPr id="4" name="Ink 3">
@@ -3671,8 +3676,8 @@
           </p:pic>
         </mc:Fallback>
       </mc:AlternateContent>
-      <mc:AlternateContent xmlns:mc="http://schemas.openxmlformats.org/markup-compatibility/2006">
-        <mc:Choice xmlns:p14="http://schemas.microsoft.com/office/powerpoint/2010/main" Requires="p14">
+      <mc:AlternateContent xmlns:mc="http://schemas.openxmlformats.org/markup-compatibility/2006" xmlns:p14="http://schemas.microsoft.com/office/powerpoint/2010/main">
+        <mc:Choice Requires="p14">
           <p:contentPart p14:bwMode="auto" r:id="rId4">
             <p14:nvContentPartPr>
               <p14:cNvPr id="7" name="Ink 6">
@@ -3691,7 +3696,7 @@
             </p14:xfrm>
           </p:contentPart>
         </mc:Choice>
-        <mc:Fallback>
+        <mc:Fallback xmlns="">
           <p:pic>
             <p:nvPicPr>
               <p:cNvPr id="7" name="Ink 6">
@@ -3722,8 +3727,8 @@
           </p:pic>
         </mc:Fallback>
       </mc:AlternateContent>
-      <mc:AlternateContent xmlns:mc="http://schemas.openxmlformats.org/markup-compatibility/2006">
-        <mc:Choice xmlns:p14="http://schemas.microsoft.com/office/powerpoint/2010/main" Requires="p14">
+      <mc:AlternateContent xmlns:mc="http://schemas.openxmlformats.org/markup-compatibility/2006" xmlns:p14="http://schemas.microsoft.com/office/powerpoint/2010/main">
+        <mc:Choice Requires="p14">
           <p:contentPart p14:bwMode="auto" r:id="rId6">
             <p14:nvContentPartPr>
               <p14:cNvPr id="8" name="Ink 7">
@@ -3742,7 +3747,7 @@
             </p14:xfrm>
           </p:contentPart>
         </mc:Choice>
-        <mc:Fallback>
+        <mc:Fallback xmlns="">
           <p:pic>
             <p:nvPicPr>
               <p:cNvPr id="8" name="Ink 7">
@@ -3773,8 +3778,8 @@
           </p:pic>
         </mc:Fallback>
       </mc:AlternateContent>
-      <mc:AlternateContent xmlns:mc="http://schemas.openxmlformats.org/markup-compatibility/2006">
-        <mc:Choice xmlns:p14="http://schemas.microsoft.com/office/powerpoint/2010/main" Requires="p14">
+      <mc:AlternateContent xmlns:mc="http://schemas.openxmlformats.org/markup-compatibility/2006" xmlns:p14="http://schemas.microsoft.com/office/powerpoint/2010/main">
+        <mc:Choice Requires="p14">
           <p:contentPart p14:bwMode="auto" r:id="rId8">
             <p14:nvContentPartPr>
               <p14:cNvPr id="10" name="Ink 9">
@@ -3793,7 +3798,7 @@
             </p14:xfrm>
           </p:contentPart>
         </mc:Choice>
-        <mc:Fallback>
+        <mc:Fallback xmlns="">
           <p:pic>
             <p:nvPicPr>
               <p:cNvPr id="10" name="Ink 9">
@@ -3824,8 +3829,8 @@
           </p:pic>
         </mc:Fallback>
       </mc:AlternateContent>
-      <mc:AlternateContent xmlns:mc="http://schemas.openxmlformats.org/markup-compatibility/2006">
-        <mc:Choice xmlns:p14="http://schemas.microsoft.com/office/powerpoint/2010/main" Requires="p14">
+      <mc:AlternateContent xmlns:mc="http://schemas.openxmlformats.org/markup-compatibility/2006" xmlns:p14="http://schemas.microsoft.com/office/powerpoint/2010/main">
+        <mc:Choice Requires="p14">
           <p:contentPart p14:bwMode="auto" r:id="rId10">
             <p14:nvContentPartPr>
               <p14:cNvPr id="11" name="Ink 10">
@@ -3844,7 +3849,7 @@
             </p14:xfrm>
           </p:contentPart>
         </mc:Choice>
-        <mc:Fallback>
+        <mc:Fallback xmlns="">
           <p:pic>
             <p:nvPicPr>
               <p:cNvPr id="11" name="Ink 10">
@@ -3890,7 +3895,7 @@
         <p:spPr>
           <a:xfrm>
             <a:off x="4251680" y="1586306"/>
-            <a:ext cx="1560812" cy="369332"/>
+            <a:ext cx="1584857" cy="369332"/>
           </a:xfrm>
           <a:prstGeom prst="rect">
             <a:avLst/>
@@ -3909,9 +3914,12 @@
             </a:r>
             <a:r>
               <a:rPr lang="en-US" baseline="-25000" dirty="0"/>
-              <a:t>0)</a:t>
-            </a:r>
-            <a:endParaRPr lang="en-US" dirty="0"/>
+              <a:t>0</a:t>
+            </a:r>
+            <a:r>
+              <a:rPr lang="en-US" dirty="0"/>
+              <a:t>)</a:t>
+            </a:r>
           </a:p>
         </p:txBody>
       </p:sp>
@@ -3930,7 +3938,7 @@
         <p:spPr>
           <a:xfrm>
             <a:off x="6300595" y="1586306"/>
-            <a:ext cx="2135265" cy="369332"/>
+            <a:ext cx="2159309" cy="369332"/>
           </a:xfrm>
           <a:prstGeom prst="rect">
             <a:avLst/>
@@ -3949,13 +3957,17 @@
             </a:r>
             <a:r>
               <a:rPr lang="en-US" baseline="-25000" dirty="0"/>
-              <a:t>0)</a:t>
-            </a:r>
-          </a:p>
-        </p:txBody>
-      </p:sp>
-      <mc:AlternateContent xmlns:mc="http://schemas.openxmlformats.org/markup-compatibility/2006">
-        <mc:Choice xmlns:a14="http://schemas.microsoft.com/office/drawing/2010/main" Requires="a14">
+              <a:t>0</a:t>
+            </a:r>
+            <a:r>
+              <a:rPr lang="en-US" dirty="0"/>
+              <a:t>)</a:t>
+            </a:r>
+          </a:p>
+        </p:txBody>
+      </p:sp>
+      <mc:AlternateContent xmlns:mc="http://schemas.openxmlformats.org/markup-compatibility/2006" xmlns:a14="http://schemas.microsoft.com/office/drawing/2010/main">
+        <mc:Choice Requires="a14">
           <p:sp>
             <p:nvSpPr>
               <p:cNvPr id="15" name="TextBox 14">
@@ -3990,6 +4002,7 @@
                 </a:r>
               </a:p>
               <a:p>
+                <a:pPr/>
                 <a14:m>
                   <m:oMathPara xmlns:m="http://schemas.openxmlformats.org/officeDocument/2006/math">
                     <m:oMathParaPr>
@@ -4014,7 +4027,7 @@
             </p:txBody>
           </p:sp>
         </mc:Choice>
-        <mc:Fallback>
+        <mc:Fallback xmlns="">
           <p:sp>
             <p:nvSpPr>
               <p:cNvPr id="15" name="TextBox 14">
@@ -4059,8 +4072,8 @@
           </p:sp>
         </mc:Fallback>
       </mc:AlternateContent>
-      <mc:AlternateContent xmlns:mc="http://schemas.openxmlformats.org/markup-compatibility/2006">
-        <mc:Choice xmlns:a14="http://schemas.microsoft.com/office/drawing/2010/main" Requires="a14">
+      <mc:AlternateContent xmlns:mc="http://schemas.openxmlformats.org/markup-compatibility/2006" xmlns:a14="http://schemas.microsoft.com/office/drawing/2010/main">
+        <mc:Choice Requires="a14">
           <p:sp>
             <p:nvSpPr>
               <p:cNvPr id="16" name="TextBox 15">
@@ -4118,7 +4131,7 @@
             </p:txBody>
           </p:sp>
         </mc:Choice>
-        <mc:Fallback>
+        <mc:Fallback xmlns="">
           <p:sp>
             <p:nvSpPr>
               <p:cNvPr id="16" name="TextBox 15">
@@ -4268,8 +4281,15 @@
             </a:r>
             <a:r>
               <a:rPr lang="en-US" baseline="-25000" dirty="0"/>
-              <a:t>0)</a:t>
-            </a:r>
+              <a:t>0</a:t>
+            </a:r>
+            <a:r>
+              <a:rPr lang="en-US" dirty="0"/>
+              <a:t>)</a:t>
+            </a:r>
+          </a:p>
+          <a:p>
+            <a:pPr algn="r"/>
             <a:r>
               <a:rPr lang="en-US" dirty="0"/>
               <a:t> is true</a:t>
@@ -4321,8 +4341,8 @@
           </a:p>
         </p:txBody>
       </p:sp>
-      <mc:AlternateContent xmlns:mc="http://schemas.openxmlformats.org/markup-compatibility/2006">
-        <mc:Choice xmlns:a14="http://schemas.microsoft.com/office/drawing/2010/main" Requires="a14">
+      <mc:AlternateContent xmlns:mc="http://schemas.openxmlformats.org/markup-compatibility/2006" xmlns:a14="http://schemas.microsoft.com/office/drawing/2010/main">
+        <mc:Choice Requires="a14">
           <p:sp>
             <p:nvSpPr>
               <p:cNvPr id="22" name="TextBox 21">
@@ -4357,6 +4377,7 @@
                 </a:r>
               </a:p>
               <a:p>
+                <a:pPr/>
                 <a14:m>
                   <m:oMathPara xmlns:m="http://schemas.openxmlformats.org/officeDocument/2006/math">
                     <m:oMathParaPr>
@@ -4388,7 +4409,7 @@
             </p:txBody>
           </p:sp>
         </mc:Choice>
-        <mc:Fallback>
+        <mc:Fallback xmlns="">
           <p:sp>
             <p:nvSpPr>
               <p:cNvPr id="22" name="TextBox 21">
@@ -4433,8 +4454,8 @@
           </p:sp>
         </mc:Fallback>
       </mc:AlternateContent>
-      <mc:AlternateContent xmlns:mc="http://schemas.openxmlformats.org/markup-compatibility/2006">
-        <mc:Choice xmlns:a14="http://schemas.microsoft.com/office/drawing/2010/main" Requires="a14">
+      <mc:AlternateContent xmlns:mc="http://schemas.openxmlformats.org/markup-compatibility/2006" xmlns:a14="http://schemas.microsoft.com/office/drawing/2010/main">
+        <mc:Choice Requires="a14">
           <p:sp>
             <p:nvSpPr>
               <p:cNvPr id="23" name="TextBox 22">
@@ -4469,6 +4490,7 @@
                 </a:r>
               </a:p>
               <a:p>
+                <a:pPr/>
                 <a14:m>
                   <m:oMathPara xmlns:m="http://schemas.openxmlformats.org/officeDocument/2006/math">
                     <m:oMathParaPr>
@@ -4497,7 +4519,7 @@
             </p:txBody>
           </p:sp>
         </mc:Choice>
-        <mc:Fallback>
+        <mc:Fallback xmlns="">
           <p:sp>
             <p:nvSpPr>
               <p:cNvPr id="23" name="TextBox 22">
@@ -4572,8 +4594,8 @@
           <a:chExt cx="0" cy="0"/>
         </a:xfrm>
       </p:grpSpPr>
-      <mc:AlternateContent xmlns:mc="http://schemas.openxmlformats.org/markup-compatibility/2006">
-        <mc:Choice xmlns:p14="http://schemas.microsoft.com/office/powerpoint/2010/main" Requires="p14">
+      <mc:AlternateContent xmlns:mc="http://schemas.openxmlformats.org/markup-compatibility/2006" xmlns:p14="http://schemas.microsoft.com/office/powerpoint/2010/main">
+        <mc:Choice Requires="p14">
           <p:contentPart p14:bwMode="auto" r:id="rId2">
             <p14:nvContentPartPr>
               <p14:cNvPr id="4" name="Ink 3">
@@ -4592,7 +4614,7 @@
             </p14:xfrm>
           </p:contentPart>
         </mc:Choice>
-        <mc:Fallback>
+        <mc:Fallback xmlns="">
           <p:pic>
             <p:nvPicPr>
               <p:cNvPr id="4" name="Ink 3">
@@ -4623,8 +4645,8 @@
           </p:pic>
         </mc:Fallback>
       </mc:AlternateContent>
-      <mc:AlternateContent xmlns:mc="http://schemas.openxmlformats.org/markup-compatibility/2006">
-        <mc:Choice xmlns:p14="http://schemas.microsoft.com/office/powerpoint/2010/main" Requires="p14">
+      <mc:AlternateContent xmlns:mc="http://schemas.openxmlformats.org/markup-compatibility/2006" xmlns:p14="http://schemas.microsoft.com/office/powerpoint/2010/main">
+        <mc:Choice Requires="p14">
           <p:contentPart p14:bwMode="auto" r:id="rId4">
             <p14:nvContentPartPr>
               <p14:cNvPr id="7" name="Ink 6">
@@ -4643,7 +4665,7 @@
             </p14:xfrm>
           </p:contentPart>
         </mc:Choice>
-        <mc:Fallback>
+        <mc:Fallback xmlns="">
           <p:pic>
             <p:nvPicPr>
               <p:cNvPr id="7" name="Ink 6">
@@ -4674,8 +4696,8 @@
           </p:pic>
         </mc:Fallback>
       </mc:AlternateContent>
-      <mc:AlternateContent xmlns:mc="http://schemas.openxmlformats.org/markup-compatibility/2006">
-        <mc:Choice xmlns:p14="http://schemas.microsoft.com/office/powerpoint/2010/main" Requires="p14">
+      <mc:AlternateContent xmlns:mc="http://schemas.openxmlformats.org/markup-compatibility/2006" xmlns:p14="http://schemas.microsoft.com/office/powerpoint/2010/main">
+        <mc:Choice Requires="p14">
           <p:contentPart p14:bwMode="auto" r:id="rId6">
             <p14:nvContentPartPr>
               <p14:cNvPr id="8" name="Ink 7">
@@ -4694,7 +4716,7 @@
             </p14:xfrm>
           </p:contentPart>
         </mc:Choice>
-        <mc:Fallback>
+        <mc:Fallback xmlns="">
           <p:pic>
             <p:nvPicPr>
               <p:cNvPr id="8" name="Ink 7">
@@ -4725,8 +4747,8 @@
           </p:pic>
         </mc:Fallback>
       </mc:AlternateContent>
-      <mc:AlternateContent xmlns:mc="http://schemas.openxmlformats.org/markup-compatibility/2006">
-        <mc:Choice xmlns:p14="http://schemas.microsoft.com/office/powerpoint/2010/main" Requires="p14">
+      <mc:AlternateContent xmlns:mc="http://schemas.openxmlformats.org/markup-compatibility/2006" xmlns:p14="http://schemas.microsoft.com/office/powerpoint/2010/main">
+        <mc:Choice Requires="p14">
           <p:contentPart p14:bwMode="auto" r:id="rId8">
             <p14:nvContentPartPr>
               <p14:cNvPr id="10" name="Ink 9">
@@ -4745,7 +4767,7 @@
             </p14:xfrm>
           </p:contentPart>
         </mc:Choice>
-        <mc:Fallback>
+        <mc:Fallback xmlns="">
           <p:pic>
             <p:nvPicPr>
               <p:cNvPr id="10" name="Ink 9">
@@ -4776,8 +4798,8 @@
           </p:pic>
         </mc:Fallback>
       </mc:AlternateContent>
-      <mc:AlternateContent xmlns:mc="http://schemas.openxmlformats.org/markup-compatibility/2006">
-        <mc:Choice xmlns:p14="http://schemas.microsoft.com/office/powerpoint/2010/main" Requires="p14">
+      <mc:AlternateContent xmlns:mc="http://schemas.openxmlformats.org/markup-compatibility/2006" xmlns:p14="http://schemas.microsoft.com/office/powerpoint/2010/main">
+        <mc:Choice Requires="p14">
           <p:contentPart p14:bwMode="auto" r:id="rId10">
             <p14:nvContentPartPr>
               <p14:cNvPr id="11" name="Ink 10">
@@ -4796,7 +4818,7 @@
             </p14:xfrm>
           </p:contentPart>
         </mc:Choice>
-        <mc:Fallback>
+        <mc:Fallback xmlns="">
           <p:pic>
             <p:nvPicPr>
               <p:cNvPr id="11" name="Ink 10">
@@ -4827,87 +4849,8 @@
           </p:pic>
         </mc:Fallback>
       </mc:AlternateContent>
-      <p:sp>
-        <p:nvSpPr>
-          <p:cNvPr id="12" name="TextBox 11">
-            <a:extLst>
-              <a:ext uri="{FF2B5EF4-FFF2-40B4-BE49-F238E27FC236}">
-                <a16:creationId xmlns:a16="http://schemas.microsoft.com/office/drawing/2014/main" id="{446220B9-178E-74AD-F63D-0BED26FD4B75}"/>
-              </a:ext>
-            </a:extLst>
-          </p:cNvPr>
-          <p:cNvSpPr txBox="1"/>
-          <p:nvPr/>
-        </p:nvSpPr>
-        <p:spPr>
-          <a:xfrm>
-            <a:off x="4251680" y="1586306"/>
-            <a:ext cx="1560812" cy="369332"/>
-          </a:xfrm>
-          <a:prstGeom prst="rect">
-            <a:avLst/>
-          </a:prstGeom>
-          <a:noFill/>
-        </p:spPr>
-        <p:txBody>
-          <a:bodyPr wrap="none" rtlCol="0">
-            <a:spAutoFit/>
-          </a:bodyPr>
-          <a:lstStyle/>
-          <a:p>
-            <a:r>
-              <a:rPr lang="en-US" dirty="0"/>
-              <a:t>Reject null (H</a:t>
-            </a:r>
-            <a:r>
-              <a:rPr lang="en-US" baseline="-25000" dirty="0"/>
-              <a:t>0)</a:t>
-            </a:r>
-            <a:endParaRPr lang="en-US" dirty="0"/>
-          </a:p>
-        </p:txBody>
-      </p:sp>
-      <p:sp>
-        <p:nvSpPr>
-          <p:cNvPr id="13" name="TextBox 12">
-            <a:extLst>
-              <a:ext uri="{FF2B5EF4-FFF2-40B4-BE49-F238E27FC236}">
-                <a16:creationId xmlns:a16="http://schemas.microsoft.com/office/drawing/2014/main" id="{A0124EC3-2D18-EE12-C929-C116C1CF3BB1}"/>
-              </a:ext>
-            </a:extLst>
-          </p:cNvPr>
-          <p:cNvSpPr txBox="1"/>
-          <p:nvPr/>
-        </p:nvSpPr>
-        <p:spPr>
-          <a:xfrm>
-            <a:off x="6300595" y="1586306"/>
-            <a:ext cx="2135265" cy="369332"/>
-          </a:xfrm>
-          <a:prstGeom prst="rect">
-            <a:avLst/>
-          </a:prstGeom>
-          <a:noFill/>
-        </p:spPr>
-        <p:txBody>
-          <a:bodyPr wrap="none" rtlCol="0">
-            <a:spAutoFit/>
-          </a:bodyPr>
-          <a:lstStyle/>
-          <a:p>
-            <a:r>
-              <a:rPr lang="en-US" dirty="0"/>
-              <a:t>Fail to reject null (H</a:t>
-            </a:r>
-            <a:r>
-              <a:rPr lang="en-US" baseline="-25000" dirty="0"/>
-              <a:t>0)</a:t>
-            </a:r>
-          </a:p>
-        </p:txBody>
-      </p:sp>
-      <mc:AlternateContent xmlns:mc="http://schemas.openxmlformats.org/markup-compatibility/2006">
-        <mc:Choice xmlns:a14="http://schemas.microsoft.com/office/drawing/2010/main" Requires="a14">
+      <mc:AlternateContent xmlns:mc="http://schemas.openxmlformats.org/markup-compatibility/2006" xmlns:a14="http://schemas.microsoft.com/office/drawing/2010/main">
+        <mc:Choice Requires="a14">
           <p:sp>
             <p:nvSpPr>
               <p:cNvPr id="15" name="TextBox 14">
@@ -4967,7 +4910,7 @@
             </p:txBody>
           </p:sp>
         </mc:Choice>
-        <mc:Fallback>
+        <mc:Fallback xmlns="">
           <p:sp>
             <p:nvSpPr>
               <p:cNvPr id="15" name="TextBox 14">
@@ -5012,8 +4955,8 @@
           </p:sp>
         </mc:Fallback>
       </mc:AlternateContent>
-      <mc:AlternateContent xmlns:mc="http://schemas.openxmlformats.org/markup-compatibility/2006">
-        <mc:Choice xmlns:a14="http://schemas.microsoft.com/office/drawing/2010/main" Requires="a14">
+      <mc:AlternateContent xmlns:mc="http://schemas.openxmlformats.org/markup-compatibility/2006" xmlns:a14="http://schemas.microsoft.com/office/drawing/2010/main">
+        <mc:Choice Requires="a14">
           <p:sp>
             <p:nvSpPr>
               <p:cNvPr id="16" name="TextBox 15">
@@ -5071,7 +5014,7 @@
             </p:txBody>
           </p:sp>
         </mc:Choice>
-        <mc:Fallback>
+        <mc:Fallback xmlns="">
           <p:sp>
             <p:nvSpPr>
               <p:cNvPr id="16" name="TextBox 15">
@@ -5186,96 +5129,8 @@
           </a:p>
         </p:txBody>
       </p:sp>
-      <p:sp>
-        <p:nvSpPr>
-          <p:cNvPr id="20" name="TextBox 19">
-            <a:extLst>
-              <a:ext uri="{FF2B5EF4-FFF2-40B4-BE49-F238E27FC236}">
-                <a16:creationId xmlns:a16="http://schemas.microsoft.com/office/drawing/2014/main" id="{287A9BF6-4DF7-04D2-6FCD-8DB1640DDA6A}"/>
-              </a:ext>
-            </a:extLst>
-          </p:cNvPr>
-          <p:cNvSpPr txBox="1"/>
-          <p:nvPr/>
-        </p:nvSpPr>
-        <p:spPr>
-          <a:xfrm>
-            <a:off x="2901848" y="2348751"/>
-            <a:ext cx="992941" cy="646331"/>
-          </a:xfrm>
-          <a:prstGeom prst="rect">
-            <a:avLst/>
-          </a:prstGeom>
-          <a:noFill/>
-        </p:spPr>
-        <p:txBody>
-          <a:bodyPr wrap="square" rtlCol="0">
-            <a:spAutoFit/>
-          </a:bodyPr>
-          <a:lstStyle/>
-          <a:p>
-            <a:pPr algn="r"/>
-            <a:r>
-              <a:rPr lang="en-US" dirty="0"/>
-              <a:t>Null (H</a:t>
-            </a:r>
-            <a:r>
-              <a:rPr lang="en-US" baseline="-25000" dirty="0"/>
-              <a:t>0)</a:t>
-            </a:r>
-            <a:r>
-              <a:rPr lang="en-US" dirty="0"/>
-              <a:t> is true</a:t>
-            </a:r>
-          </a:p>
-        </p:txBody>
-      </p:sp>
-      <p:sp>
-        <p:nvSpPr>
-          <p:cNvPr id="21" name="TextBox 20">
-            <a:extLst>
-              <a:ext uri="{FF2B5EF4-FFF2-40B4-BE49-F238E27FC236}">
-                <a16:creationId xmlns:a16="http://schemas.microsoft.com/office/drawing/2014/main" id="{CB9F36A8-3FE6-6F59-6C36-26B5354FC322}"/>
-              </a:ext>
-            </a:extLst>
-          </p:cNvPr>
-          <p:cNvSpPr txBox="1"/>
-          <p:nvPr/>
-        </p:nvSpPr>
-        <p:spPr>
-          <a:xfrm>
-            <a:off x="2898052" y="3429000"/>
-            <a:ext cx="992941" cy="646331"/>
-          </a:xfrm>
-          <a:prstGeom prst="rect">
-            <a:avLst/>
-          </a:prstGeom>
-          <a:noFill/>
-        </p:spPr>
-        <p:txBody>
-          <a:bodyPr wrap="square" rtlCol="0">
-            <a:spAutoFit/>
-          </a:bodyPr>
-          <a:lstStyle/>
-          <a:p>
-            <a:pPr algn="r"/>
-            <a:r>
-              <a:rPr lang="en-US" dirty="0"/>
-              <a:t>Null (H</a:t>
-            </a:r>
-            <a:r>
-              <a:rPr lang="en-US" baseline="-25000" dirty="0"/>
-              <a:t>0</a:t>
-            </a:r>
-            <a:r>
-              <a:rPr lang="en-US" dirty="0"/>
-              <a:t>) is false</a:t>
-            </a:r>
-          </a:p>
-        </p:txBody>
-      </p:sp>
-      <mc:AlternateContent xmlns:mc="http://schemas.openxmlformats.org/markup-compatibility/2006">
-        <mc:Choice xmlns:a14="http://schemas.microsoft.com/office/drawing/2010/main" Requires="a14">
+      <mc:AlternateContent xmlns:mc="http://schemas.openxmlformats.org/markup-compatibility/2006" xmlns:a14="http://schemas.microsoft.com/office/drawing/2010/main">
+        <mc:Choice Requires="a14">
           <p:sp>
             <p:nvSpPr>
               <p:cNvPr id="22" name="TextBox 21">
@@ -5342,7 +5197,7 @@
             </p:txBody>
           </p:sp>
         </mc:Choice>
-        <mc:Fallback>
+        <mc:Fallback xmlns="">
           <p:sp>
             <p:nvSpPr>
               <p:cNvPr id="22" name="TextBox 21">
@@ -5387,8 +5242,8 @@
           </p:sp>
         </mc:Fallback>
       </mc:AlternateContent>
-      <mc:AlternateContent xmlns:mc="http://schemas.openxmlformats.org/markup-compatibility/2006">
-        <mc:Choice xmlns:a14="http://schemas.microsoft.com/office/drawing/2010/main" Requires="a14">
+      <mc:AlternateContent xmlns:mc="http://schemas.openxmlformats.org/markup-compatibility/2006" xmlns:a14="http://schemas.microsoft.com/office/drawing/2010/main">
+        <mc:Choice Requires="a14">
           <p:sp>
             <p:nvSpPr>
               <p:cNvPr id="23" name="TextBox 22">
@@ -5452,7 +5307,7 @@
             </p:txBody>
           </p:sp>
         </mc:Choice>
-        <mc:Fallback>
+        <mc:Fallback xmlns="">
           <p:sp>
             <p:nvSpPr>
               <p:cNvPr id="23" name="TextBox 22">
@@ -5497,8 +5352,8 @@
           </p:sp>
         </mc:Fallback>
       </mc:AlternateContent>
-      <mc:AlternateContent xmlns:mc="http://schemas.openxmlformats.org/markup-compatibility/2006">
-        <mc:Choice xmlns:p14="http://schemas.microsoft.com/office/powerpoint/2010/main" Requires="p14">
+      <mc:AlternateContent xmlns:mc="http://schemas.openxmlformats.org/markup-compatibility/2006" xmlns:p14="http://schemas.microsoft.com/office/powerpoint/2010/main">
+        <mc:Choice Requires="p14">
           <p:contentPart p14:bwMode="auto" r:id="rId16">
             <p14:nvContentPartPr>
               <p14:cNvPr id="2" name="Ink 1">
@@ -5517,7 +5372,7 @@
             </p14:xfrm>
           </p:contentPart>
         </mc:Choice>
-        <mc:Fallback>
+        <mc:Fallback xmlns="">
           <p:pic>
             <p:nvPicPr>
               <p:cNvPr id="2" name="Ink 1">
@@ -5581,6 +5436,187 @@
                 <a:latin typeface="Times" pitchFamily="2" charset="0"/>
               </a:rPr>
               <a:t>Power to reject the null</a:t>
+            </a:r>
+          </a:p>
+        </p:txBody>
+      </p:sp>
+      <p:sp>
+        <p:nvSpPr>
+          <p:cNvPr id="5" name="TextBox 4">
+            <a:extLst>
+              <a:ext uri="{FF2B5EF4-FFF2-40B4-BE49-F238E27FC236}">
+                <a16:creationId xmlns:a16="http://schemas.microsoft.com/office/drawing/2014/main" id="{0542F3B1-9A6A-9170-717A-D86468E79C0B}"/>
+              </a:ext>
+            </a:extLst>
+          </p:cNvPr>
+          <p:cNvSpPr txBox="1"/>
+          <p:nvPr/>
+        </p:nvSpPr>
+        <p:spPr>
+          <a:xfrm>
+            <a:off x="4251680" y="1586306"/>
+            <a:ext cx="1584857" cy="369332"/>
+          </a:xfrm>
+          <a:prstGeom prst="rect">
+            <a:avLst/>
+          </a:prstGeom>
+          <a:noFill/>
+        </p:spPr>
+        <p:txBody>
+          <a:bodyPr wrap="none" rtlCol="0">
+            <a:spAutoFit/>
+          </a:bodyPr>
+          <a:lstStyle/>
+          <a:p>
+            <a:r>
+              <a:rPr lang="en-US" dirty="0"/>
+              <a:t>Reject null (H</a:t>
+            </a:r>
+            <a:r>
+              <a:rPr lang="en-US" baseline="-25000" dirty="0"/>
+              <a:t>0</a:t>
+            </a:r>
+            <a:r>
+              <a:rPr lang="en-US" dirty="0"/>
+              <a:t>)</a:t>
+            </a:r>
+          </a:p>
+        </p:txBody>
+      </p:sp>
+      <p:sp>
+        <p:nvSpPr>
+          <p:cNvPr id="6" name="TextBox 5">
+            <a:extLst>
+              <a:ext uri="{FF2B5EF4-FFF2-40B4-BE49-F238E27FC236}">
+                <a16:creationId xmlns:a16="http://schemas.microsoft.com/office/drawing/2014/main" id="{3A002D00-2C4B-EEE0-5B05-2BEE68E073C0}"/>
+              </a:ext>
+            </a:extLst>
+          </p:cNvPr>
+          <p:cNvSpPr txBox="1"/>
+          <p:nvPr/>
+        </p:nvSpPr>
+        <p:spPr>
+          <a:xfrm>
+            <a:off x="6300595" y="1586306"/>
+            <a:ext cx="2159309" cy="369332"/>
+          </a:xfrm>
+          <a:prstGeom prst="rect">
+            <a:avLst/>
+          </a:prstGeom>
+          <a:noFill/>
+        </p:spPr>
+        <p:txBody>
+          <a:bodyPr wrap="none" rtlCol="0">
+            <a:spAutoFit/>
+          </a:bodyPr>
+          <a:lstStyle/>
+          <a:p>
+            <a:r>
+              <a:rPr lang="en-US" dirty="0"/>
+              <a:t>Fail to reject null (H</a:t>
+            </a:r>
+            <a:r>
+              <a:rPr lang="en-US" baseline="-25000" dirty="0"/>
+              <a:t>0</a:t>
+            </a:r>
+            <a:r>
+              <a:rPr lang="en-US" dirty="0"/>
+              <a:t>)</a:t>
+            </a:r>
+          </a:p>
+        </p:txBody>
+      </p:sp>
+      <p:sp>
+        <p:nvSpPr>
+          <p:cNvPr id="9" name="TextBox 8">
+            <a:extLst>
+              <a:ext uri="{FF2B5EF4-FFF2-40B4-BE49-F238E27FC236}">
+                <a16:creationId xmlns:a16="http://schemas.microsoft.com/office/drawing/2014/main" id="{4ED71AF3-89F6-B6EB-EC8A-DA17365CF04A}"/>
+              </a:ext>
+            </a:extLst>
+          </p:cNvPr>
+          <p:cNvSpPr txBox="1"/>
+          <p:nvPr/>
+        </p:nvSpPr>
+        <p:spPr>
+          <a:xfrm>
+            <a:off x="2901848" y="2348751"/>
+            <a:ext cx="992941" cy="646331"/>
+          </a:xfrm>
+          <a:prstGeom prst="rect">
+            <a:avLst/>
+          </a:prstGeom>
+          <a:noFill/>
+        </p:spPr>
+        <p:txBody>
+          <a:bodyPr wrap="square" rtlCol="0">
+            <a:spAutoFit/>
+          </a:bodyPr>
+          <a:lstStyle/>
+          <a:p>
+            <a:pPr algn="r"/>
+            <a:r>
+              <a:rPr lang="en-US" dirty="0"/>
+              <a:t>Null (H</a:t>
+            </a:r>
+            <a:r>
+              <a:rPr lang="en-US" baseline="-25000" dirty="0"/>
+              <a:t>0</a:t>
+            </a:r>
+            <a:r>
+              <a:rPr lang="en-US" dirty="0"/>
+              <a:t>)</a:t>
+            </a:r>
+          </a:p>
+          <a:p>
+            <a:pPr algn="r"/>
+            <a:r>
+              <a:rPr lang="en-US" dirty="0"/>
+              <a:t> is true</a:t>
+            </a:r>
+          </a:p>
+        </p:txBody>
+      </p:sp>
+      <p:sp>
+        <p:nvSpPr>
+          <p:cNvPr id="14" name="TextBox 13">
+            <a:extLst>
+              <a:ext uri="{FF2B5EF4-FFF2-40B4-BE49-F238E27FC236}">
+                <a16:creationId xmlns:a16="http://schemas.microsoft.com/office/drawing/2014/main" id="{E5023629-74F6-2203-D336-7A5303C3DBEB}"/>
+              </a:ext>
+            </a:extLst>
+          </p:cNvPr>
+          <p:cNvSpPr txBox="1"/>
+          <p:nvPr/>
+        </p:nvSpPr>
+        <p:spPr>
+          <a:xfrm>
+            <a:off x="2898052" y="3429000"/>
+            <a:ext cx="992941" cy="646331"/>
+          </a:xfrm>
+          <a:prstGeom prst="rect">
+            <a:avLst/>
+          </a:prstGeom>
+          <a:noFill/>
+        </p:spPr>
+        <p:txBody>
+          <a:bodyPr wrap="square" rtlCol="0">
+            <a:spAutoFit/>
+          </a:bodyPr>
+          <a:lstStyle/>
+          <a:p>
+            <a:pPr algn="r"/>
+            <a:r>
+              <a:rPr lang="en-US" dirty="0"/>
+              <a:t>Null (H</a:t>
+            </a:r>
+            <a:r>
+              <a:rPr lang="en-US" baseline="-25000" dirty="0"/>
+              <a:t>0</a:t>
+            </a:r>
+            <a:r>
+              <a:rPr lang="en-US" dirty="0"/>
+              <a:t>) is false</a:t>
             </a:r>
           </a:p>
         </p:txBody>

</xml_diff>

<commit_message>
inference and design tweaks
</commit_message>
<xml_diff>
--- a/images/inference/power-diagram.pptx
+++ b/images/inference/power-diagram.pptx
@@ -694,7 +694,7 @@
           <a:p>
             <a:fld id="{5303E370-D265-2C46-8068-DCA558B4929C}" type="datetimeFigureOut">
               <a:rPr lang="en-US" smtClean="0"/>
-              <a:t>10/26/22</a:t>
+              <a:t>10/8/23</a:t>
             </a:fld>
             <a:endParaRPr lang="en-US"/>
           </a:p>
@@ -892,7 +892,7 @@
           <a:p>
             <a:fld id="{5303E370-D265-2C46-8068-DCA558B4929C}" type="datetimeFigureOut">
               <a:rPr lang="en-US" smtClean="0"/>
-              <a:t>10/26/22</a:t>
+              <a:t>10/8/23</a:t>
             </a:fld>
             <a:endParaRPr lang="en-US"/>
           </a:p>
@@ -1100,7 +1100,7 @@
           <a:p>
             <a:fld id="{5303E370-D265-2C46-8068-DCA558B4929C}" type="datetimeFigureOut">
               <a:rPr lang="en-US" smtClean="0"/>
-              <a:t>10/26/22</a:t>
+              <a:t>10/8/23</a:t>
             </a:fld>
             <a:endParaRPr lang="en-US"/>
           </a:p>
@@ -1298,7 +1298,7 @@
           <a:p>
             <a:fld id="{5303E370-D265-2C46-8068-DCA558B4929C}" type="datetimeFigureOut">
               <a:rPr lang="en-US" smtClean="0"/>
-              <a:t>10/26/22</a:t>
+              <a:t>10/8/23</a:t>
             </a:fld>
             <a:endParaRPr lang="en-US"/>
           </a:p>
@@ -1573,7 +1573,7 @@
           <a:p>
             <a:fld id="{5303E370-D265-2C46-8068-DCA558B4929C}" type="datetimeFigureOut">
               <a:rPr lang="en-US" smtClean="0"/>
-              <a:t>10/26/22</a:t>
+              <a:t>10/8/23</a:t>
             </a:fld>
             <a:endParaRPr lang="en-US"/>
           </a:p>
@@ -1838,7 +1838,7 @@
           <a:p>
             <a:fld id="{5303E370-D265-2C46-8068-DCA558B4929C}" type="datetimeFigureOut">
               <a:rPr lang="en-US" smtClean="0"/>
-              <a:t>10/26/22</a:t>
+              <a:t>10/8/23</a:t>
             </a:fld>
             <a:endParaRPr lang="en-US"/>
           </a:p>
@@ -2250,7 +2250,7 @@
           <a:p>
             <a:fld id="{5303E370-D265-2C46-8068-DCA558B4929C}" type="datetimeFigureOut">
               <a:rPr lang="en-US" smtClean="0"/>
-              <a:t>10/26/22</a:t>
+              <a:t>10/8/23</a:t>
             </a:fld>
             <a:endParaRPr lang="en-US"/>
           </a:p>
@@ -2391,7 +2391,7 @@
           <a:p>
             <a:fld id="{5303E370-D265-2C46-8068-DCA558B4929C}" type="datetimeFigureOut">
               <a:rPr lang="en-US" smtClean="0"/>
-              <a:t>10/26/22</a:t>
+              <a:t>10/8/23</a:t>
             </a:fld>
             <a:endParaRPr lang="en-US"/>
           </a:p>
@@ -2504,7 +2504,7 @@
           <a:p>
             <a:fld id="{5303E370-D265-2C46-8068-DCA558B4929C}" type="datetimeFigureOut">
               <a:rPr lang="en-US" smtClean="0"/>
-              <a:t>10/26/22</a:t>
+              <a:t>10/8/23</a:t>
             </a:fld>
             <a:endParaRPr lang="en-US"/>
           </a:p>
@@ -2815,7 +2815,7 @@
           <a:p>
             <a:fld id="{5303E370-D265-2C46-8068-DCA558B4929C}" type="datetimeFigureOut">
               <a:rPr lang="en-US" smtClean="0"/>
-              <a:t>10/26/22</a:t>
+              <a:t>10/8/23</a:t>
             </a:fld>
             <a:endParaRPr lang="en-US"/>
           </a:p>
@@ -3103,7 +3103,7 @@
           <a:p>
             <a:fld id="{5303E370-D265-2C46-8068-DCA558B4929C}" type="datetimeFigureOut">
               <a:rPr lang="en-US" smtClean="0"/>
-              <a:t>10/26/22</a:t>
+              <a:t>10/8/23</a:t>
             </a:fld>
             <a:endParaRPr lang="en-US"/>
           </a:p>
@@ -3344,7 +3344,7 @@
           <a:p>
             <a:fld id="{5303E370-D265-2C46-8068-DCA558B4929C}" type="datetimeFigureOut">
               <a:rPr lang="en-US" smtClean="0"/>
-              <a:t>10/26/22</a:t>
+              <a:t>10/8/23</a:t>
             </a:fld>
             <a:endParaRPr lang="en-US"/>
           </a:p>
@@ -6158,7 +6158,7 @@
         </p:nvSpPr>
         <p:spPr>
           <a:xfrm>
-            <a:off x="7762761" y="4435574"/>
+            <a:off x="7700848" y="3334337"/>
             <a:ext cx="1947873" cy="923330"/>
           </a:xfrm>
           <a:prstGeom prst="rect">
@@ -6194,7 +6194,7 @@
         </p:nvSpPr>
         <p:spPr>
           <a:xfrm>
-            <a:off x="5526391" y="3425991"/>
+            <a:off x="5561301" y="4445982"/>
             <a:ext cx="2025367" cy="923330"/>
           </a:xfrm>
           <a:prstGeom prst="rect">
@@ -6235,8 +6235,8 @@
         </p:nvSpPr>
         <p:spPr>
           <a:xfrm>
-            <a:off x="3915020" y="3564491"/>
-            <a:ext cx="1239271" cy="646331"/>
+            <a:off x="3816711" y="4584481"/>
+            <a:ext cx="1391414" cy="646331"/>
           </a:xfrm>
           <a:prstGeom prst="rect">
             <a:avLst/>
@@ -6252,7 +6252,7 @@
             <a:pPr algn="ctr"/>
             <a:r>
               <a:rPr lang="en-US" b="1" dirty="0"/>
-              <a:t>Hypothesis testing</a:t>
+              <a:t>Hypothesis focused</a:t>
             </a:r>
           </a:p>
         </p:txBody>
@@ -6271,8 +6271,8 @@
         </p:nvSpPr>
         <p:spPr>
           <a:xfrm>
-            <a:off x="3762876" y="4435574"/>
-            <a:ext cx="1543558" cy="923330"/>
+            <a:off x="3740639" y="3539589"/>
+            <a:ext cx="1543558" cy="646331"/>
           </a:xfrm>
           <a:prstGeom prst="rect">
             <a:avLst/>
@@ -6288,7 +6288,7 @@
             <a:pPr algn="ctr"/>
             <a:r>
               <a:rPr lang="en-US" b="1" dirty="0"/>
-              <a:t>Estimation with uncertainty</a:t>
+              <a:t>Measurement focused</a:t>
             </a:r>
           </a:p>
         </p:txBody>
@@ -6307,7 +6307,7 @@
         </p:nvSpPr>
         <p:spPr>
           <a:xfrm>
-            <a:off x="8073406" y="3702990"/>
+            <a:off x="8108316" y="4722981"/>
             <a:ext cx="1326582" cy="369332"/>
           </a:xfrm>
           <a:prstGeom prst="rect">
@@ -6342,7 +6342,7 @@
         </p:nvSpPr>
         <p:spPr>
           <a:xfrm>
-            <a:off x="5526391" y="4574074"/>
+            <a:off x="5464478" y="3472837"/>
             <a:ext cx="2025367" cy="646331"/>
           </a:xfrm>
           <a:prstGeom prst="rect">

</xml_diff>